<commit_message>
Adding slides of presentation
</commit_message>
<xml_diff>
--- a/Documents/Building Modern RESTFul API's With ASP.NET Core - Architectural Overview.pptx
+++ b/Documents/Building Modern RESTFul API's With ASP.NET Core - Architectural Overview.pptx
@@ -8,14 +8,19 @@
     <p:sldId id="256" r:id="rId2"/>
     <p:sldId id="258" r:id="rId3"/>
     <p:sldId id="259" r:id="rId4"/>
-    <p:sldId id="260" r:id="rId5"/>
-    <p:sldId id="261" r:id="rId6"/>
-    <p:sldId id="262" r:id="rId7"/>
-    <p:sldId id="263" r:id="rId8"/>
-    <p:sldId id="264" r:id="rId9"/>
-    <p:sldId id="265" r:id="rId10"/>
-    <p:sldId id="266" r:id="rId11"/>
-    <p:sldId id="267" r:id="rId12"/>
+    <p:sldId id="270" r:id="rId5"/>
+    <p:sldId id="260" r:id="rId6"/>
+    <p:sldId id="261" r:id="rId7"/>
+    <p:sldId id="271" r:id="rId8"/>
+    <p:sldId id="262" r:id="rId9"/>
+    <p:sldId id="263" r:id="rId10"/>
+    <p:sldId id="264" r:id="rId11"/>
+    <p:sldId id="265" r:id="rId12"/>
+    <p:sldId id="272" r:id="rId13"/>
+    <p:sldId id="268" r:id="rId14"/>
+    <p:sldId id="266" r:id="rId15"/>
+    <p:sldId id="267" r:id="rId16"/>
+    <p:sldId id="269" r:id="rId17"/>
   </p:sldIdLst>
   <p:sldSz cx="12192000" cy="6858000"/>
   <p:notesSz cx="6858000" cy="9144000"/>
@@ -5874,6 +5879,416 @@
         </p:spPr>
         <p:txBody>
           <a:bodyPr>
+            <a:normAutofit/>
+          </a:bodyPr>
+          <a:lstStyle/>
+          <a:p>
+            <a:pPr algn="ctr"/>
+            <a:r>
+              <a:rPr lang="pt-BR" dirty="0" err="1" smtClean="0"/>
+              <a:t>Generic</a:t>
+            </a:r>
+            <a:r>
+              <a:rPr lang="pt-BR" dirty="0" smtClean="0"/>
+              <a:t> </a:t>
+            </a:r>
+            <a:r>
+              <a:rPr lang="pt-BR" dirty="0" err="1" smtClean="0"/>
+              <a:t>Repository</a:t>
+            </a:r>
+            <a:endParaRPr lang="pt-BR" dirty="0"/>
+          </a:p>
+        </p:txBody>
+      </p:sp>
+    </p:spTree>
+    <p:extLst>
+      <p:ext uri="{BB962C8B-B14F-4D97-AF65-F5344CB8AC3E}">
+        <p14:creationId xmlns:p14="http://schemas.microsoft.com/office/powerpoint/2010/main" val="1549041027"/>
+      </p:ext>
+    </p:extLst>
+  </p:cSld>
+  <p:clrMapOvr>
+    <a:masterClrMapping/>
+  </p:clrMapOvr>
+  <p:timing>
+    <p:tnLst>
+      <p:par>
+        <p:cTn id="1" dur="indefinite" restart="never" nodeType="tmRoot"/>
+      </p:par>
+    </p:tnLst>
+  </p:timing>
+</p:sld>
+</file>
+
+<file path=ppt/slides/slide11.xml><?xml version="1.0" encoding="utf-8"?>
+<p:sld xmlns:a="http://schemas.openxmlformats.org/drawingml/2006/main" xmlns:r="http://schemas.openxmlformats.org/officeDocument/2006/relationships" xmlns:p="http://schemas.openxmlformats.org/presentationml/2006/main">
+  <p:cSld>
+    <p:spTree>
+      <p:nvGrpSpPr>
+        <p:cNvPr id="1" name=""/>
+        <p:cNvGrpSpPr/>
+        <p:nvPr/>
+      </p:nvGrpSpPr>
+      <p:grpSpPr>
+        <a:xfrm>
+          <a:off x="0" y="0"/>
+          <a:ext cx="0" cy="0"/>
+          <a:chOff x="0" y="0"/>
+          <a:chExt cx="0" cy="0"/>
+        </a:xfrm>
+      </p:grpSpPr>
+      <p:pic>
+        <p:nvPicPr>
+          <p:cNvPr id="1026" name="Picture 2" descr="Resultado de imagem para Generic Repository pattern"/>
+          <p:cNvPicPr>
+            <a:picLocks noChangeAspect="1" noChangeArrowheads="1"/>
+          </p:cNvPicPr>
+          <p:nvPr/>
+        </p:nvPicPr>
+        <p:blipFill>
+          <a:blip r:embed="rId2">
+            <a:extLst>
+              <a:ext uri="{28A0092B-C50C-407E-A947-70E740481C1C}">
+                <a14:useLocalDpi xmlns:a14="http://schemas.microsoft.com/office/drawing/2010/main" val="0"/>
+              </a:ext>
+            </a:extLst>
+          </a:blip>
+          <a:srcRect/>
+          <a:stretch>
+            <a:fillRect/>
+          </a:stretch>
+        </p:blipFill>
+        <p:spPr bwMode="auto">
+          <a:xfrm>
+            <a:off x="641712" y="1480113"/>
+            <a:ext cx="10391775" cy="3581400"/>
+          </a:xfrm>
+          <a:prstGeom prst="rect">
+            <a:avLst/>
+          </a:prstGeom>
+          <a:noFill/>
+          <a:extLst>
+            <a:ext uri="{909E8E84-426E-40DD-AFC4-6F175D3DCCD1}">
+              <a14:hiddenFill xmlns:a14="http://schemas.microsoft.com/office/drawing/2010/main">
+                <a:solidFill>
+                  <a:srgbClr val="FFFFFF"/>
+                </a:solidFill>
+              </a14:hiddenFill>
+            </a:ext>
+          </a:extLst>
+        </p:spPr>
+      </p:pic>
+    </p:spTree>
+    <p:extLst>
+      <p:ext uri="{BB962C8B-B14F-4D97-AF65-F5344CB8AC3E}">
+        <p14:creationId xmlns:p14="http://schemas.microsoft.com/office/powerpoint/2010/main" val="2309341346"/>
+      </p:ext>
+    </p:extLst>
+  </p:cSld>
+  <p:clrMapOvr>
+    <a:masterClrMapping/>
+  </p:clrMapOvr>
+  <p:timing>
+    <p:tnLst>
+      <p:par>
+        <p:cTn id="1" dur="indefinite" restart="never" nodeType="tmRoot"/>
+      </p:par>
+    </p:tnLst>
+  </p:timing>
+</p:sld>
+</file>
+
+<file path=ppt/slides/slide12.xml><?xml version="1.0" encoding="utf-8"?>
+<p:sld xmlns:a="http://schemas.openxmlformats.org/drawingml/2006/main" xmlns:r="http://schemas.openxmlformats.org/officeDocument/2006/relationships" xmlns:p="http://schemas.openxmlformats.org/presentationml/2006/main">
+  <p:cSld>
+    <p:spTree>
+      <p:nvGrpSpPr>
+        <p:cNvPr id="1" name=""/>
+        <p:cNvGrpSpPr/>
+        <p:nvPr/>
+      </p:nvGrpSpPr>
+      <p:grpSpPr>
+        <a:xfrm>
+          <a:off x="0" y="0"/>
+          <a:ext cx="0" cy="0"/>
+          <a:chOff x="0" y="0"/>
+          <a:chExt cx="0" cy="0"/>
+        </a:xfrm>
+      </p:grpSpPr>
+      <p:sp>
+        <p:nvSpPr>
+          <p:cNvPr id="2" name="Título 1"/>
+          <p:cNvSpPr>
+            <a:spLocks noGrp="1"/>
+          </p:cNvSpPr>
+          <p:nvPr>
+            <p:ph type="title"/>
+          </p:nvPr>
+        </p:nvSpPr>
+        <p:spPr/>
+        <p:txBody>
+          <a:bodyPr/>
+          <a:lstStyle/>
+          <a:p>
+            <a:endParaRPr lang="pt-BR"/>
+          </a:p>
+        </p:txBody>
+      </p:sp>
+      <p:pic>
+        <p:nvPicPr>
+          <p:cNvPr id="4" name="Espaço Reservado para Conteúdo 3"/>
+          <p:cNvPicPr>
+            <a:picLocks noGrp="1" noChangeAspect="1"/>
+          </p:cNvPicPr>
+          <p:nvPr>
+            <p:ph idx="1"/>
+          </p:nvPr>
+        </p:nvPicPr>
+        <p:blipFill>
+          <a:blip r:embed="rId2">
+            <a:extLst>
+              <a:ext uri="{28A0092B-C50C-407E-A947-70E740481C1C}">
+                <a14:useLocalDpi xmlns:a14="http://schemas.microsoft.com/office/drawing/2010/main" val="0"/>
+              </a:ext>
+            </a:extLst>
+          </a:blip>
+          <a:stretch>
+            <a:fillRect/>
+          </a:stretch>
+        </p:blipFill>
+        <p:spPr>
+          <a:xfrm>
+            <a:off x="-162046" y="-1053296"/>
+            <a:ext cx="12576585" cy="9528466"/>
+          </a:xfrm>
+        </p:spPr>
+      </p:pic>
+    </p:spTree>
+    <p:extLst>
+      <p:ext uri="{BB962C8B-B14F-4D97-AF65-F5344CB8AC3E}">
+        <p14:creationId xmlns:p14="http://schemas.microsoft.com/office/powerpoint/2010/main" val="1735659003"/>
+      </p:ext>
+    </p:extLst>
+  </p:cSld>
+  <p:clrMapOvr>
+    <a:masterClrMapping/>
+  </p:clrMapOvr>
+  <p:timing>
+    <p:tnLst>
+      <p:par>
+        <p:cTn id="1" dur="indefinite" restart="never" nodeType="tmRoot"/>
+      </p:par>
+    </p:tnLst>
+  </p:timing>
+</p:sld>
+</file>
+
+<file path=ppt/slides/slide13.xml><?xml version="1.0" encoding="utf-8"?>
+<p:sld xmlns:a="http://schemas.openxmlformats.org/drawingml/2006/main" xmlns:r="http://schemas.openxmlformats.org/officeDocument/2006/relationships" xmlns:p="http://schemas.openxmlformats.org/presentationml/2006/main">
+  <p:cSld>
+    <p:spTree>
+      <p:nvGrpSpPr>
+        <p:cNvPr id="1" name=""/>
+        <p:cNvGrpSpPr/>
+        <p:nvPr/>
+      </p:nvGrpSpPr>
+      <p:grpSpPr>
+        <a:xfrm>
+          <a:off x="0" y="0"/>
+          <a:ext cx="0" cy="0"/>
+          <a:chOff x="0" y="0"/>
+          <a:chExt cx="0" cy="0"/>
+        </a:xfrm>
+      </p:grpSpPr>
+      <p:sp>
+        <p:nvSpPr>
+          <p:cNvPr id="2" name="Título 1"/>
+          <p:cNvSpPr>
+            <a:spLocks noGrp="1"/>
+          </p:cNvSpPr>
+          <p:nvPr>
+            <p:ph type="title"/>
+          </p:nvPr>
+        </p:nvSpPr>
+        <p:spPr/>
+        <p:txBody>
+          <a:bodyPr/>
+          <a:lstStyle/>
+          <a:p>
+            <a:r>
+              <a:rPr lang="pt-BR" dirty="0" smtClean="0"/>
+              <a:t>Referências</a:t>
+            </a:r>
+            <a:endParaRPr lang="pt-BR" dirty="0"/>
+          </a:p>
+        </p:txBody>
+      </p:sp>
+      <p:sp>
+        <p:nvSpPr>
+          <p:cNvPr id="3" name="Espaço Reservado para Conteúdo 2"/>
+          <p:cNvSpPr>
+            <a:spLocks noGrp="1"/>
+          </p:cNvSpPr>
+          <p:nvPr>
+            <p:ph idx="1"/>
+          </p:nvPr>
+        </p:nvSpPr>
+        <p:spPr/>
+        <p:txBody>
+          <a:bodyPr>
+            <a:normAutofit fontScale="92500" lnSpcReduction="20000"/>
+          </a:bodyPr>
+          <a:lstStyle/>
+          <a:p>
+            <a:r>
+              <a:rPr lang="pt-BR" dirty="0">
+                <a:hlinkClick r:id="rId2"/>
+              </a:rPr>
+              <a:t>http://</a:t>
+            </a:r>
+            <a:r>
+              <a:rPr lang="pt-BR" dirty="0" smtClean="0">
+                <a:hlinkClick r:id="rId2"/>
+              </a:rPr>
+              <a:t>www.dotnetcurry.com/aspnet-mvc/1155/aspnet-mvc-repository-pattern-perform-database-operations</a:t>
+            </a:r>
+            <a:endParaRPr lang="pt-BR" dirty="0" smtClean="0"/>
+          </a:p>
+          <a:p>
+            <a:endParaRPr lang="pt-BR" dirty="0"/>
+          </a:p>
+          <a:p>
+            <a:r>
+              <a:rPr lang="pt-BR" dirty="0">
+                <a:hlinkClick r:id="rId3"/>
+              </a:rPr>
+              <a:t>https://www.c-sharpcorner.com/UploadFile/8a67c0/repository-pattern-and-generic-repository-pattern</a:t>
+            </a:r>
+            <a:r>
+              <a:rPr lang="pt-BR" dirty="0" smtClean="0">
+                <a:hlinkClick r:id="rId3"/>
+              </a:rPr>
+              <a:t>/</a:t>
+            </a:r>
+            <a:endParaRPr lang="pt-BR" dirty="0" smtClean="0"/>
+          </a:p>
+          <a:p>
+            <a:endParaRPr lang="pt-BR" dirty="0"/>
+          </a:p>
+          <a:p>
+            <a:r>
+              <a:rPr lang="pt-BR" dirty="0">
+                <a:hlinkClick r:id="rId4"/>
+              </a:rPr>
+              <a:t>http://</a:t>
+            </a:r>
+            <a:r>
+              <a:rPr lang="pt-BR" dirty="0" smtClean="0">
+                <a:hlinkClick r:id="rId4"/>
+              </a:rPr>
+              <a:t>www.tugberkugurlu.com/archive/generic-repository-pattern-entity-framework-asp-net-mvc-and-unit-testing-triangle</a:t>
+            </a:r>
+            <a:endParaRPr lang="pt-BR" dirty="0" smtClean="0"/>
+          </a:p>
+          <a:p>
+            <a:endParaRPr lang="pt-BR" dirty="0"/>
+          </a:p>
+          <a:p>
+            <a:r>
+              <a:rPr lang="pt-BR" dirty="0">
+                <a:hlinkClick r:id="rId5"/>
+              </a:rPr>
+              <a:t>https://</a:t>
+            </a:r>
+            <a:r>
+              <a:rPr lang="pt-BR" dirty="0" smtClean="0">
+                <a:hlinkClick r:id="rId5"/>
+              </a:rPr>
+              <a:t>www.codeproject.com/Articles/814768/CRUD-Operations-Using-the-Generic-Repository-Patte</a:t>
+            </a:r>
+            <a:endParaRPr lang="pt-BR" dirty="0" smtClean="0"/>
+          </a:p>
+          <a:p>
+            <a:endParaRPr lang="pt-BR" dirty="0"/>
+          </a:p>
+          <a:p>
+            <a:r>
+              <a:rPr lang="pt-BR" dirty="0">
+                <a:hlinkClick r:id="rId6"/>
+              </a:rPr>
+              <a:t>http://</a:t>
+            </a:r>
+            <a:r>
+              <a:rPr lang="pt-BR" dirty="0" smtClean="0">
+                <a:hlinkClick r:id="rId6"/>
+              </a:rPr>
+              <a:t>hannesdorfmann.com/android/evolution-of-the-repository-pattern</a:t>
+            </a:r>
+            <a:endParaRPr lang="pt-BR" dirty="0" smtClean="0"/>
+          </a:p>
+          <a:p>
+            <a:endParaRPr lang="pt-BR" dirty="0" smtClean="0"/>
+          </a:p>
+          <a:p>
+            <a:endParaRPr lang="pt-BR" dirty="0"/>
+          </a:p>
+        </p:txBody>
+      </p:sp>
+    </p:spTree>
+    <p:extLst>
+      <p:ext uri="{BB962C8B-B14F-4D97-AF65-F5344CB8AC3E}">
+        <p14:creationId xmlns:p14="http://schemas.microsoft.com/office/powerpoint/2010/main" val="109744129"/>
+      </p:ext>
+    </p:extLst>
+  </p:cSld>
+  <p:clrMapOvr>
+    <a:masterClrMapping/>
+  </p:clrMapOvr>
+  <p:timing>
+    <p:tnLst>
+      <p:par>
+        <p:cTn id="1" dur="indefinite" restart="never" nodeType="tmRoot"/>
+      </p:par>
+    </p:tnLst>
+  </p:timing>
+</p:sld>
+</file>
+
+<file path=ppt/slides/slide14.xml><?xml version="1.0" encoding="utf-8"?>
+<p:sld xmlns:a="http://schemas.openxmlformats.org/drawingml/2006/main" xmlns:r="http://schemas.openxmlformats.org/officeDocument/2006/relationships" xmlns:p="http://schemas.openxmlformats.org/presentationml/2006/main">
+  <p:cSld>
+    <p:spTree>
+      <p:nvGrpSpPr>
+        <p:cNvPr id="1" name=""/>
+        <p:cNvGrpSpPr/>
+        <p:nvPr/>
+      </p:nvGrpSpPr>
+      <p:grpSpPr>
+        <a:xfrm>
+          <a:off x="0" y="0"/>
+          <a:ext cx="0" cy="0"/>
+          <a:chOff x="0" y="0"/>
+          <a:chExt cx="0" cy="0"/>
+        </a:xfrm>
+      </p:grpSpPr>
+      <p:sp>
+        <p:nvSpPr>
+          <p:cNvPr id="2" name="Título 1"/>
+          <p:cNvSpPr>
+            <a:spLocks noGrp="1"/>
+          </p:cNvSpPr>
+          <p:nvPr>
+            <p:ph type="title"/>
+          </p:nvPr>
+        </p:nvSpPr>
+        <p:spPr>
+          <a:xfrm>
+            <a:off x="2207568" y="2924944"/>
+            <a:ext cx="8229600" cy="990600"/>
+          </a:xfrm>
+        </p:spPr>
+        <p:txBody>
+          <a:bodyPr>
             <a:normAutofit fontScale="90000"/>
           </a:bodyPr>
           <a:lstStyle/>
@@ -5919,7 +6334,7 @@
 </p:sld>
 </file>
 
-<file path=ppt/slides/slide11.xml><?xml version="1.0" encoding="utf-8"?>
+<file path=ppt/slides/slide15.xml><?xml version="1.0" encoding="utf-8"?>
 <p:sld xmlns:a="http://schemas.openxmlformats.org/drawingml/2006/main" xmlns:r="http://schemas.openxmlformats.org/officeDocument/2006/relationships" xmlns:p="http://schemas.openxmlformats.org/presentationml/2006/main">
   <p:cSld>
     <p:spTree>
@@ -5997,6 +6412,158 @@
 </p:sld>
 </file>
 
+<file path=ppt/slides/slide16.xml><?xml version="1.0" encoding="utf-8"?>
+<p:sld xmlns:a="http://schemas.openxmlformats.org/drawingml/2006/main" xmlns:r="http://schemas.openxmlformats.org/officeDocument/2006/relationships" xmlns:p="http://schemas.openxmlformats.org/presentationml/2006/main">
+  <p:cSld>
+    <p:spTree>
+      <p:nvGrpSpPr>
+        <p:cNvPr id="1" name=""/>
+        <p:cNvGrpSpPr/>
+        <p:nvPr/>
+      </p:nvGrpSpPr>
+      <p:grpSpPr>
+        <a:xfrm>
+          <a:off x="0" y="0"/>
+          <a:ext cx="0" cy="0"/>
+          <a:chOff x="0" y="0"/>
+          <a:chExt cx="0" cy="0"/>
+        </a:xfrm>
+      </p:grpSpPr>
+      <p:sp>
+        <p:nvSpPr>
+          <p:cNvPr id="2" name="Título 1"/>
+          <p:cNvSpPr>
+            <a:spLocks noGrp="1"/>
+          </p:cNvSpPr>
+          <p:nvPr>
+            <p:ph type="title"/>
+          </p:nvPr>
+        </p:nvSpPr>
+        <p:spPr/>
+        <p:txBody>
+          <a:bodyPr/>
+          <a:lstStyle/>
+          <a:p>
+            <a:r>
+              <a:rPr lang="pt-BR" dirty="0" smtClean="0"/>
+              <a:t>Referências</a:t>
+            </a:r>
+            <a:endParaRPr lang="pt-BR" dirty="0"/>
+          </a:p>
+        </p:txBody>
+      </p:sp>
+      <p:sp>
+        <p:nvSpPr>
+          <p:cNvPr id="3" name="Espaço Reservado para Conteúdo 2"/>
+          <p:cNvSpPr>
+            <a:spLocks noGrp="1"/>
+          </p:cNvSpPr>
+          <p:nvPr>
+            <p:ph idx="1"/>
+          </p:nvPr>
+        </p:nvSpPr>
+        <p:spPr/>
+        <p:txBody>
+          <a:bodyPr/>
+          <a:lstStyle/>
+          <a:p>
+            <a:r>
+              <a:rPr lang="pt-BR" dirty="0">
+                <a:hlinkClick r:id="rId2"/>
+              </a:rPr>
+              <a:t>https://martinfowler.com/bliki/ValueObject.html</a:t>
+            </a:r>
+            <a:endParaRPr lang="pt-BR" dirty="0" smtClean="0">
+              <a:hlinkClick r:id="rId2"/>
+            </a:endParaRPr>
+          </a:p>
+          <a:p>
+            <a:endParaRPr lang="pt-BR" dirty="0">
+              <a:hlinkClick r:id="rId2"/>
+            </a:endParaRPr>
+          </a:p>
+          <a:p>
+            <a:r>
+              <a:rPr lang="pt-BR" dirty="0" smtClean="0">
+                <a:hlinkClick r:id="rId2"/>
+              </a:rPr>
+              <a:t>https</a:t>
+            </a:r>
+            <a:r>
+              <a:rPr lang="pt-BR" dirty="0">
+                <a:hlinkClick r:id="rId2"/>
+              </a:rPr>
+              <a:t>://</a:t>
+            </a:r>
+            <a:r>
+              <a:rPr lang="pt-BR" dirty="0" smtClean="0">
+                <a:hlinkClick r:id="rId2"/>
+              </a:rPr>
+              <a:t>www.codeadventure.com/blog/why-you-should-use-value-objects</a:t>
+            </a:r>
+            <a:endParaRPr lang="pt-BR" dirty="0" smtClean="0"/>
+          </a:p>
+          <a:p>
+            <a:endParaRPr lang="pt-BR" dirty="0"/>
+          </a:p>
+          <a:p>
+            <a:r>
+              <a:rPr lang="pt-BR" dirty="0">
+                <a:hlinkClick r:id="rId3"/>
+              </a:rPr>
+              <a:t>https://</a:t>
+            </a:r>
+            <a:r>
+              <a:rPr lang="pt-BR" dirty="0" smtClean="0">
+                <a:hlinkClick r:id="rId3"/>
+              </a:rPr>
+              <a:t>www.devmedia.com.br/diferenca-entre-os-patterns-po-pojo-bo-dto-e-vo/28162</a:t>
+            </a:r>
+            <a:endParaRPr lang="pt-BR" dirty="0" smtClean="0"/>
+          </a:p>
+          <a:p>
+            <a:endParaRPr lang="pt-BR" dirty="0"/>
+          </a:p>
+          <a:p>
+            <a:r>
+              <a:rPr lang="pt-BR" dirty="0">
+                <a:hlinkClick r:id="rId4"/>
+              </a:rPr>
+              <a:t>https://</a:t>
+            </a:r>
+            <a:r>
+              <a:rPr lang="pt-BR" dirty="0" smtClean="0">
+                <a:hlinkClick r:id="rId4"/>
+              </a:rPr>
+              <a:t>imasters.com.br/artigo/7293/linguagens/padroes-de-projeto-value-object?trace=1519021197</a:t>
+            </a:r>
+            <a:endParaRPr lang="pt-BR" dirty="0" smtClean="0"/>
+          </a:p>
+          <a:p>
+            <a:endParaRPr lang="pt-BR" dirty="0"/>
+          </a:p>
+        </p:txBody>
+      </p:sp>
+    </p:spTree>
+    <p:extLst>
+      <p:ext uri="{BB962C8B-B14F-4D97-AF65-F5344CB8AC3E}">
+        <p14:creationId xmlns:p14="http://schemas.microsoft.com/office/powerpoint/2010/main" val="57151941"/>
+      </p:ext>
+    </p:extLst>
+  </p:cSld>
+  <p:clrMapOvr>
+    <a:masterClrMapping/>
+  </p:clrMapOvr>
+  <p:timing>
+    <p:tnLst>
+      <p:par>
+        <p:cTn id="1" dur="indefinite" restart="never" nodeType="tmRoot"/>
+      </p:par>
+    </p:tnLst>
+  </p:timing>
+</p:sld>
+</file>
+
 <file path=ppt/slides/slide2.xml><?xml version="1.0" encoding="utf-8"?>
 <p:sld xmlns:a="http://schemas.openxmlformats.org/drawingml/2006/main" xmlns:r="http://schemas.openxmlformats.org/officeDocument/2006/relationships" xmlns:p="http://schemas.openxmlformats.org/presentationml/2006/main">
   <p:cSld>
@@ -6086,6 +6653,88 @@
           <a:chExt cx="0" cy="0"/>
         </a:xfrm>
       </p:grpSpPr>
+      <p:pic>
+        <p:nvPicPr>
+          <p:cNvPr id="2050" name="Picture 2" descr="Resultado de imagem para api versioning strategy"/>
+          <p:cNvPicPr>
+            <a:picLocks noChangeAspect="1" noChangeArrowheads="1"/>
+          </p:cNvPicPr>
+          <p:nvPr/>
+        </p:nvPicPr>
+        <p:blipFill>
+          <a:blip r:embed="rId2">
+            <a:extLst>
+              <a:ext uri="{28A0092B-C50C-407E-A947-70E740481C1C}">
+                <a14:useLocalDpi xmlns:a14="http://schemas.microsoft.com/office/drawing/2010/main" val="0"/>
+              </a:ext>
+            </a:extLst>
+          </a:blip>
+          <a:srcRect/>
+          <a:stretch>
+            <a:fillRect/>
+          </a:stretch>
+        </p:blipFill>
+        <p:spPr bwMode="auto">
+          <a:xfrm>
+            <a:off x="271322" y="1277033"/>
+            <a:ext cx="4876800" cy="4333875"/>
+          </a:xfrm>
+          <a:prstGeom prst="rect">
+            <a:avLst/>
+          </a:prstGeom>
+          <a:noFill/>
+          <a:extLst>
+            <a:ext uri="{909E8E84-426E-40DD-AFC4-6F175D3DCCD1}">
+              <a14:hiddenFill xmlns:a14="http://schemas.microsoft.com/office/drawing/2010/main">
+                <a:solidFill>
+                  <a:srgbClr val="FFFFFF"/>
+                </a:solidFill>
+              </a14:hiddenFill>
+            </a:ext>
+          </a:extLst>
+        </p:spPr>
+      </p:pic>
+      <p:pic>
+        <p:nvPicPr>
+          <p:cNvPr id="2052" name="Picture 4" descr="Resultado de imagem para api versioning strategy"/>
+          <p:cNvPicPr>
+            <a:picLocks noChangeAspect="1" noChangeArrowheads="1"/>
+          </p:cNvPicPr>
+          <p:nvPr/>
+        </p:nvPicPr>
+        <p:blipFill>
+          <a:blip r:embed="rId3">
+            <a:extLst>
+              <a:ext uri="{28A0092B-C50C-407E-A947-70E740481C1C}">
+                <a14:useLocalDpi xmlns:a14="http://schemas.microsoft.com/office/drawing/2010/main" val="0"/>
+              </a:ext>
+            </a:extLst>
+          </a:blip>
+          <a:srcRect/>
+          <a:stretch>
+            <a:fillRect/>
+          </a:stretch>
+        </p:blipFill>
+        <p:spPr bwMode="auto">
+          <a:xfrm>
+            <a:off x="5148122" y="2036561"/>
+            <a:ext cx="5561393" cy="2651186"/>
+          </a:xfrm>
+          <a:prstGeom prst="rect">
+            <a:avLst/>
+          </a:prstGeom>
+          <a:noFill/>
+          <a:extLst>
+            <a:ext uri="{909E8E84-426E-40DD-AFC4-6F175D3DCCD1}">
+              <a14:hiddenFill xmlns:a14="http://schemas.microsoft.com/office/drawing/2010/main">
+                <a:solidFill>
+                  <a:srgbClr val="FFFFFF"/>
+                </a:solidFill>
+              </a14:hiddenFill>
+            </a:ext>
+          </a:extLst>
+        </p:spPr>
+      </p:pic>
     </p:spTree>
     <p:extLst>
       <p:ext uri="{BB962C8B-B14F-4D97-AF65-F5344CB8AC3E}">
@@ -6133,6 +6782,177 @@
             <p:ph type="title"/>
           </p:nvPr>
         </p:nvSpPr>
+        <p:spPr/>
+        <p:txBody>
+          <a:bodyPr/>
+          <a:lstStyle/>
+          <a:p>
+            <a:r>
+              <a:rPr lang="pt-BR" dirty="0" smtClean="0"/>
+              <a:t>Referências</a:t>
+            </a:r>
+            <a:endParaRPr lang="pt-BR" dirty="0"/>
+          </a:p>
+        </p:txBody>
+      </p:sp>
+      <p:sp>
+        <p:nvSpPr>
+          <p:cNvPr id="3" name="Espaço Reservado para Conteúdo 2"/>
+          <p:cNvSpPr>
+            <a:spLocks noGrp="1"/>
+          </p:cNvSpPr>
+          <p:nvPr>
+            <p:ph idx="1"/>
+          </p:nvPr>
+        </p:nvSpPr>
+        <p:spPr/>
+        <p:txBody>
+          <a:bodyPr>
+            <a:normAutofit/>
+          </a:bodyPr>
+          <a:lstStyle/>
+          <a:p>
+            <a:r>
+              <a:rPr lang="pt-BR" dirty="0">
+                <a:hlinkClick r:id="rId2"/>
+              </a:rPr>
+              <a:t>https://</a:t>
+            </a:r>
+            <a:r>
+              <a:rPr lang="pt-BR" dirty="0" smtClean="0">
+                <a:hlinkClick r:id="rId2"/>
+              </a:rPr>
+              <a:t>msdn.microsoft.com/en-us/library/ff384251.aspx</a:t>
+            </a:r>
+            <a:endParaRPr lang="pt-BR" dirty="0" smtClean="0"/>
+          </a:p>
+          <a:p>
+            <a:endParaRPr lang="pt-BR" dirty="0"/>
+          </a:p>
+          <a:p>
+            <a:r>
+              <a:rPr lang="pt-BR" dirty="0">
+                <a:hlinkClick r:id="rId3"/>
+              </a:rPr>
+              <a:t>https://nordicapis.com/introduction-to-api-versioning-best-practices</a:t>
+            </a:r>
+            <a:r>
+              <a:rPr lang="pt-BR" dirty="0" smtClean="0">
+                <a:hlinkClick r:id="rId3"/>
+              </a:rPr>
+              <a:t>/</a:t>
+            </a:r>
+            <a:endParaRPr lang="pt-BR" dirty="0" smtClean="0"/>
+          </a:p>
+          <a:p>
+            <a:endParaRPr lang="pt-BR" dirty="0" smtClean="0"/>
+          </a:p>
+          <a:p>
+            <a:r>
+              <a:rPr lang="pt-BR" dirty="0">
+                <a:hlinkClick r:id="rId4"/>
+              </a:rPr>
+              <a:t>http://</a:t>
+            </a:r>
+            <a:r>
+              <a:rPr lang="pt-BR" dirty="0" smtClean="0">
+                <a:hlinkClick r:id="rId4"/>
+              </a:rPr>
+              <a:t>www.patrickniezen.com/2016/2/11/api-versioning-with-mvc-6</a:t>
+            </a:r>
+            <a:endParaRPr lang="pt-BR" dirty="0" smtClean="0"/>
+          </a:p>
+          <a:p>
+            <a:endParaRPr lang="pt-BR" dirty="0"/>
+          </a:p>
+          <a:p>
+            <a:r>
+              <a:rPr lang="pt-BR" dirty="0">
+                <a:hlinkClick r:id="rId5"/>
+              </a:rPr>
+              <a:t>https://www.troyhunt.com/your-api-versioning-is-wrong-which-is</a:t>
+            </a:r>
+            <a:r>
+              <a:rPr lang="pt-BR" dirty="0" smtClean="0">
+                <a:hlinkClick r:id="rId5"/>
+              </a:rPr>
+              <a:t>/</a:t>
+            </a:r>
+            <a:endParaRPr lang="pt-BR" dirty="0" smtClean="0"/>
+          </a:p>
+          <a:p>
+            <a:endParaRPr lang="pt-BR" dirty="0"/>
+          </a:p>
+          <a:p>
+            <a:r>
+              <a:rPr lang="pt-BR" dirty="0">
+                <a:hlinkClick r:id="rId6"/>
+              </a:rPr>
+              <a:t>https://</a:t>
+            </a:r>
+            <a:r>
+              <a:rPr lang="pt-BR" dirty="0" smtClean="0">
+                <a:hlinkClick r:id="rId6"/>
+              </a:rPr>
+              <a:t>www.youtube.com/watch?v=55oIJuMUnDc</a:t>
+            </a:r>
+            <a:endParaRPr lang="pt-BR" dirty="0" smtClean="0"/>
+          </a:p>
+          <a:p>
+            <a:endParaRPr lang="pt-BR" dirty="0" smtClean="0"/>
+          </a:p>
+          <a:p>
+            <a:endParaRPr lang="pt-BR" dirty="0"/>
+          </a:p>
+        </p:txBody>
+      </p:sp>
+    </p:spTree>
+    <p:extLst>
+      <p:ext uri="{BB962C8B-B14F-4D97-AF65-F5344CB8AC3E}">
+        <p14:creationId xmlns:p14="http://schemas.microsoft.com/office/powerpoint/2010/main" val="807800927"/>
+      </p:ext>
+    </p:extLst>
+  </p:cSld>
+  <p:clrMapOvr>
+    <a:masterClrMapping/>
+  </p:clrMapOvr>
+  <p:timing>
+    <p:tnLst>
+      <p:par>
+        <p:cTn id="1" dur="indefinite" restart="never" nodeType="tmRoot"/>
+      </p:par>
+    </p:tnLst>
+  </p:timing>
+</p:sld>
+</file>
+
+<file path=ppt/slides/slide5.xml><?xml version="1.0" encoding="utf-8"?>
+<p:sld xmlns:a="http://schemas.openxmlformats.org/drawingml/2006/main" xmlns:r="http://schemas.openxmlformats.org/officeDocument/2006/relationships" xmlns:p="http://schemas.openxmlformats.org/presentationml/2006/main">
+  <p:cSld>
+    <p:spTree>
+      <p:nvGrpSpPr>
+        <p:cNvPr id="1" name=""/>
+        <p:cNvGrpSpPr/>
+        <p:nvPr/>
+      </p:nvGrpSpPr>
+      <p:grpSpPr>
+        <a:xfrm>
+          <a:off x="0" y="0"/>
+          <a:ext cx="0" cy="0"/>
+          <a:chOff x="0" y="0"/>
+          <a:chExt cx="0" cy="0"/>
+        </a:xfrm>
+      </p:grpSpPr>
+      <p:sp>
+        <p:nvSpPr>
+          <p:cNvPr id="2" name="Título 1"/>
+          <p:cNvSpPr>
+            <a:spLocks noGrp="1"/>
+          </p:cNvSpPr>
+          <p:nvPr>
+            <p:ph type="title"/>
+          </p:nvPr>
+        </p:nvSpPr>
         <p:spPr>
           <a:xfrm>
             <a:off x="2207568" y="2924944"/>
@@ -6174,7 +6994,7 @@
 </p:sld>
 </file>
 
-<file path=ppt/slides/slide5.xml><?xml version="1.0" encoding="utf-8"?>
+<file path=ppt/slides/slide6.xml><?xml version="1.0" encoding="utf-8"?>
 <p:sld xmlns:a="http://schemas.openxmlformats.org/drawingml/2006/main" xmlns:r="http://schemas.openxmlformats.org/officeDocument/2006/relationships" xmlns:p="http://schemas.openxmlformats.org/presentationml/2006/main">
   <p:cSld>
     <p:spTree>
@@ -6252,7 +7072,178 @@
 </p:sld>
 </file>
 
-<file path=ppt/slides/slide6.xml><?xml version="1.0" encoding="utf-8"?>
+<file path=ppt/slides/slide7.xml><?xml version="1.0" encoding="utf-8"?>
+<p:sld xmlns:a="http://schemas.openxmlformats.org/drawingml/2006/main" xmlns:r="http://schemas.openxmlformats.org/officeDocument/2006/relationships" xmlns:p="http://schemas.openxmlformats.org/presentationml/2006/main">
+  <p:cSld>
+    <p:spTree>
+      <p:nvGrpSpPr>
+        <p:cNvPr id="1" name=""/>
+        <p:cNvGrpSpPr/>
+        <p:nvPr/>
+      </p:nvGrpSpPr>
+      <p:grpSpPr>
+        <a:xfrm>
+          <a:off x="0" y="0"/>
+          <a:ext cx="0" cy="0"/>
+          <a:chOff x="0" y="0"/>
+          <a:chExt cx="0" cy="0"/>
+        </a:xfrm>
+      </p:grpSpPr>
+      <p:sp>
+        <p:nvSpPr>
+          <p:cNvPr id="2" name="Título 1"/>
+          <p:cNvSpPr>
+            <a:spLocks noGrp="1"/>
+          </p:cNvSpPr>
+          <p:nvPr>
+            <p:ph type="title"/>
+          </p:nvPr>
+        </p:nvSpPr>
+        <p:spPr/>
+        <p:txBody>
+          <a:bodyPr/>
+          <a:lstStyle/>
+          <a:p>
+            <a:r>
+              <a:rPr lang="pt-BR" dirty="0" smtClean="0"/>
+              <a:t>Referências</a:t>
+            </a:r>
+            <a:endParaRPr lang="pt-BR" dirty="0"/>
+          </a:p>
+        </p:txBody>
+      </p:sp>
+      <p:sp>
+        <p:nvSpPr>
+          <p:cNvPr id="3" name="Espaço Reservado para Conteúdo 2"/>
+          <p:cNvSpPr>
+            <a:spLocks noGrp="1"/>
+          </p:cNvSpPr>
+          <p:nvPr>
+            <p:ph idx="1"/>
+          </p:nvPr>
+        </p:nvSpPr>
+        <p:spPr/>
+        <p:txBody>
+          <a:bodyPr>
+            <a:normAutofit/>
+          </a:bodyPr>
+          <a:lstStyle/>
+          <a:p>
+            <a:r>
+              <a:rPr lang="pt-BR" dirty="0">
+                <a:hlinkClick r:id="rId2"/>
+              </a:rPr>
+              <a:t>https://</a:t>
+            </a:r>
+            <a:r>
+              <a:rPr lang="pt-BR" dirty="0" smtClean="0">
+                <a:hlinkClick r:id="rId2"/>
+              </a:rPr>
+              <a:t>martinfowler.com/bliki/PresentationDomainDataLayering.html</a:t>
+            </a:r>
+            <a:endParaRPr lang="pt-BR" dirty="0" smtClean="0"/>
+          </a:p>
+          <a:p>
+            <a:endParaRPr lang="pt-BR" dirty="0"/>
+          </a:p>
+          <a:p>
+            <a:r>
+              <a:rPr lang="pt-BR" dirty="0">
+                <a:hlinkClick r:id="rId3"/>
+              </a:rPr>
+              <a:t>https://</a:t>
+            </a:r>
+            <a:r>
+              <a:rPr lang="pt-BR" dirty="0" smtClean="0">
+                <a:hlinkClick r:id="rId3"/>
+              </a:rPr>
+              <a:t>msdn.microsoft.com/en-us/library/ee658109.aspx</a:t>
+            </a:r>
+            <a:endParaRPr lang="pt-BR" dirty="0" smtClean="0"/>
+          </a:p>
+          <a:p>
+            <a:endParaRPr lang="pt-BR" dirty="0"/>
+          </a:p>
+          <a:p>
+            <a:r>
+              <a:rPr lang="pt-BR" dirty="0">
+                <a:hlinkClick r:id="rId4"/>
+              </a:rPr>
+              <a:t>https://</a:t>
+            </a:r>
+            <a:r>
+              <a:rPr lang="pt-BR" dirty="0" smtClean="0">
+                <a:hlinkClick r:id="rId4"/>
+              </a:rPr>
+              <a:t>msdn.microsoft.com/en-us/library/ff648105.aspx</a:t>
+            </a:r>
+            <a:endParaRPr lang="pt-BR" dirty="0" smtClean="0"/>
+          </a:p>
+          <a:p>
+            <a:endParaRPr lang="pt-BR" dirty="0"/>
+          </a:p>
+          <a:p>
+            <a:r>
+              <a:rPr lang="pt-BR" dirty="0">
+                <a:hlinkClick r:id="rId5"/>
+              </a:rPr>
+              <a:t>https://</a:t>
+            </a:r>
+            <a:r>
+              <a:rPr lang="pt-BR" dirty="0" smtClean="0">
+                <a:hlinkClick r:id="rId5"/>
+              </a:rPr>
+              <a:t>en.wikipedia.org/wiki/Multitier_architecture</a:t>
+            </a:r>
+            <a:endParaRPr lang="pt-BR" dirty="0" smtClean="0"/>
+          </a:p>
+          <a:p>
+            <a:endParaRPr lang="pt-BR" dirty="0"/>
+          </a:p>
+          <a:p>
+            <a:r>
+              <a:rPr lang="pt-BR" dirty="0">
+                <a:hlinkClick r:id="rId6"/>
+              </a:rPr>
+              <a:t>https://</a:t>
+            </a:r>
+            <a:r>
+              <a:rPr lang="pt-BR" dirty="0" smtClean="0">
+                <a:hlinkClick r:id="rId6"/>
+              </a:rPr>
+              <a:t>www.linkedin.com/learning/practical-application-architecture-with-entity-framework-core/multi-layer-applications</a:t>
+            </a:r>
+            <a:endParaRPr lang="pt-BR" dirty="0" smtClean="0"/>
+          </a:p>
+          <a:p>
+            <a:endParaRPr lang="pt-BR" dirty="0" smtClean="0"/>
+          </a:p>
+          <a:p>
+            <a:endParaRPr lang="pt-BR" dirty="0"/>
+          </a:p>
+        </p:txBody>
+      </p:sp>
+    </p:spTree>
+    <p:extLst>
+      <p:ext uri="{BB962C8B-B14F-4D97-AF65-F5344CB8AC3E}">
+        <p14:creationId xmlns:p14="http://schemas.microsoft.com/office/powerpoint/2010/main" val="1498052144"/>
+      </p:ext>
+    </p:extLst>
+  </p:cSld>
+  <p:clrMapOvr>
+    <a:masterClrMapping/>
+  </p:clrMapOvr>
+  <p:timing>
+    <p:tnLst>
+      <p:par>
+        <p:cTn id="1" dur="indefinite" restart="never" nodeType="tmRoot"/>
+      </p:par>
+    </p:tnLst>
+  </p:timing>
+</p:sld>
+</file>
+
+<file path=ppt/slides/slide8.xml><?xml version="1.0" encoding="utf-8"?>
 <p:sld xmlns:a="http://schemas.openxmlformats.org/drawingml/2006/main" xmlns:r="http://schemas.openxmlformats.org/officeDocument/2006/relationships" xmlns:p="http://schemas.openxmlformats.org/presentationml/2006/main">
   <p:cSld>
     <p:spTree>
@@ -6324,7 +7315,7 @@
 </p:sld>
 </file>
 
-<file path=ppt/slides/slide7.xml><?xml version="1.0" encoding="utf-8"?>
+<file path=ppt/slides/slide9.xml><?xml version="1.0" encoding="utf-8"?>
 <p:sld xmlns:a="http://schemas.openxmlformats.org/drawingml/2006/main" xmlns:r="http://schemas.openxmlformats.org/officeDocument/2006/relationships" xmlns:p="http://schemas.openxmlformats.org/presentationml/2006/main">
   <p:cSld>
     <p:spTree>
@@ -6386,119 +7377,6 @@
     <p:extLst>
       <p:ext uri="{BB962C8B-B14F-4D97-AF65-F5344CB8AC3E}">
         <p14:creationId xmlns:p14="http://schemas.microsoft.com/office/powerpoint/2010/main" val="3861130617"/>
-      </p:ext>
-    </p:extLst>
-  </p:cSld>
-  <p:clrMapOvr>
-    <a:masterClrMapping/>
-  </p:clrMapOvr>
-  <p:timing>
-    <p:tnLst>
-      <p:par>
-        <p:cTn id="1" dur="indefinite" restart="never" nodeType="tmRoot"/>
-      </p:par>
-    </p:tnLst>
-  </p:timing>
-</p:sld>
-</file>
-
-<file path=ppt/slides/slide8.xml><?xml version="1.0" encoding="utf-8"?>
-<p:sld xmlns:a="http://schemas.openxmlformats.org/drawingml/2006/main" xmlns:r="http://schemas.openxmlformats.org/officeDocument/2006/relationships" xmlns:p="http://schemas.openxmlformats.org/presentationml/2006/main">
-  <p:cSld>
-    <p:spTree>
-      <p:nvGrpSpPr>
-        <p:cNvPr id="1" name=""/>
-        <p:cNvGrpSpPr/>
-        <p:nvPr/>
-      </p:nvGrpSpPr>
-      <p:grpSpPr>
-        <a:xfrm>
-          <a:off x="0" y="0"/>
-          <a:ext cx="0" cy="0"/>
-          <a:chOff x="0" y="0"/>
-          <a:chExt cx="0" cy="0"/>
-        </a:xfrm>
-      </p:grpSpPr>
-      <p:sp>
-        <p:nvSpPr>
-          <p:cNvPr id="2" name="Título 1"/>
-          <p:cNvSpPr>
-            <a:spLocks noGrp="1"/>
-          </p:cNvSpPr>
-          <p:nvPr>
-            <p:ph type="title"/>
-          </p:nvPr>
-        </p:nvSpPr>
-        <p:spPr>
-          <a:xfrm>
-            <a:off x="2207568" y="2924944"/>
-            <a:ext cx="8229600" cy="990600"/>
-          </a:xfrm>
-        </p:spPr>
-        <p:txBody>
-          <a:bodyPr>
-            <a:normAutofit/>
-          </a:bodyPr>
-          <a:lstStyle/>
-          <a:p>
-            <a:pPr algn="ctr"/>
-            <a:r>
-              <a:rPr lang="pt-BR" dirty="0" err="1" smtClean="0"/>
-              <a:t>Generic</a:t>
-            </a:r>
-            <a:r>
-              <a:rPr lang="pt-BR" dirty="0" smtClean="0"/>
-              <a:t> </a:t>
-            </a:r>
-            <a:r>
-              <a:rPr lang="pt-BR" dirty="0" err="1" smtClean="0"/>
-              <a:t>Repository</a:t>
-            </a:r>
-            <a:endParaRPr lang="pt-BR" dirty="0"/>
-          </a:p>
-        </p:txBody>
-      </p:sp>
-    </p:spTree>
-    <p:extLst>
-      <p:ext uri="{BB962C8B-B14F-4D97-AF65-F5344CB8AC3E}">
-        <p14:creationId xmlns:p14="http://schemas.microsoft.com/office/powerpoint/2010/main" val="1549041027"/>
-      </p:ext>
-    </p:extLst>
-  </p:cSld>
-  <p:clrMapOvr>
-    <a:masterClrMapping/>
-  </p:clrMapOvr>
-  <p:timing>
-    <p:tnLst>
-      <p:par>
-        <p:cTn id="1" dur="indefinite" restart="never" nodeType="tmRoot"/>
-      </p:par>
-    </p:tnLst>
-  </p:timing>
-</p:sld>
-</file>
-
-<file path=ppt/slides/slide9.xml><?xml version="1.0" encoding="utf-8"?>
-<p:sld xmlns:a="http://schemas.openxmlformats.org/drawingml/2006/main" xmlns:r="http://schemas.openxmlformats.org/officeDocument/2006/relationships" xmlns:p="http://schemas.openxmlformats.org/presentationml/2006/main">
-  <p:cSld>
-    <p:spTree>
-      <p:nvGrpSpPr>
-        <p:cNvPr id="1" name=""/>
-        <p:cNvGrpSpPr/>
-        <p:nvPr/>
-      </p:nvGrpSpPr>
-      <p:grpSpPr>
-        <a:xfrm>
-          <a:off x="0" y="0"/>
-          <a:ext cx="0" cy="0"/>
-          <a:chOff x="0" y="0"/>
-          <a:chExt cx="0" cy="0"/>
-        </a:xfrm>
-      </p:grpSpPr>
-    </p:spTree>
-    <p:extLst>
-      <p:ext uri="{BB962C8B-B14F-4D97-AF65-F5344CB8AC3E}">
-        <p14:creationId xmlns:p14="http://schemas.microsoft.com/office/powerpoint/2010/main" val="2309341346"/>
       </p:ext>
     </p:extLst>
   </p:cSld>

</xml_diff>